<commit_message>
Made some fixes to freezing point depression (code and powerpoint)
</commit_message>
<xml_diff>
--- a/Thermo 2022 (Neshyba)/Lectures/Week 9 - Phase equilibria/Week 9.4 (Friday) Synthesis.pptx
+++ b/Thermo 2022 (Neshyba)/Lectures/Week 9 - Phase equilibria/Week 9.4 (Friday) Synthesis.pptx
@@ -267,7 +267,7 @@
           <a:p>
             <a:fld id="{0EDA919C-F3E3-7543-A7A8-6F0F918CD698}" type="datetimeFigureOut">
               <a:rPr lang="en-US" smtClean="0"/>
-              <a:t>10/29/21</a:t>
+              <a:t>1/6/22</a:t>
             </a:fld>
             <a:endParaRPr lang="en-US"/>
           </a:p>
@@ -465,7 +465,7 @@
           <a:p>
             <a:fld id="{0EDA919C-F3E3-7543-A7A8-6F0F918CD698}" type="datetimeFigureOut">
               <a:rPr lang="en-US" smtClean="0"/>
-              <a:t>10/29/21</a:t>
+              <a:t>1/6/22</a:t>
             </a:fld>
             <a:endParaRPr lang="en-US"/>
           </a:p>
@@ -673,7 +673,7 @@
           <a:p>
             <a:fld id="{0EDA919C-F3E3-7543-A7A8-6F0F918CD698}" type="datetimeFigureOut">
               <a:rPr lang="en-US" smtClean="0"/>
-              <a:t>10/29/21</a:t>
+              <a:t>1/6/22</a:t>
             </a:fld>
             <a:endParaRPr lang="en-US"/>
           </a:p>
@@ -871,7 +871,7 @@
           <a:p>
             <a:fld id="{0EDA919C-F3E3-7543-A7A8-6F0F918CD698}" type="datetimeFigureOut">
               <a:rPr lang="en-US" smtClean="0"/>
-              <a:t>10/29/21</a:t>
+              <a:t>1/6/22</a:t>
             </a:fld>
             <a:endParaRPr lang="en-US"/>
           </a:p>
@@ -1146,7 +1146,7 @@
           <a:p>
             <a:fld id="{0EDA919C-F3E3-7543-A7A8-6F0F918CD698}" type="datetimeFigureOut">
               <a:rPr lang="en-US" smtClean="0"/>
-              <a:t>10/29/21</a:t>
+              <a:t>1/6/22</a:t>
             </a:fld>
             <a:endParaRPr lang="en-US"/>
           </a:p>
@@ -1411,7 +1411,7 @@
           <a:p>
             <a:fld id="{0EDA919C-F3E3-7543-A7A8-6F0F918CD698}" type="datetimeFigureOut">
               <a:rPr lang="en-US" smtClean="0"/>
-              <a:t>10/29/21</a:t>
+              <a:t>1/6/22</a:t>
             </a:fld>
             <a:endParaRPr lang="en-US"/>
           </a:p>
@@ -1823,7 +1823,7 @@
           <a:p>
             <a:fld id="{0EDA919C-F3E3-7543-A7A8-6F0F918CD698}" type="datetimeFigureOut">
               <a:rPr lang="en-US" smtClean="0"/>
-              <a:t>10/29/21</a:t>
+              <a:t>1/6/22</a:t>
             </a:fld>
             <a:endParaRPr lang="en-US"/>
           </a:p>
@@ -1964,7 +1964,7 @@
           <a:p>
             <a:fld id="{0EDA919C-F3E3-7543-A7A8-6F0F918CD698}" type="datetimeFigureOut">
               <a:rPr lang="en-US" smtClean="0"/>
-              <a:t>10/29/21</a:t>
+              <a:t>1/6/22</a:t>
             </a:fld>
             <a:endParaRPr lang="en-US"/>
           </a:p>
@@ -2077,7 +2077,7 @@
           <a:p>
             <a:fld id="{0EDA919C-F3E3-7543-A7A8-6F0F918CD698}" type="datetimeFigureOut">
               <a:rPr lang="en-US" smtClean="0"/>
-              <a:t>10/29/21</a:t>
+              <a:t>1/6/22</a:t>
             </a:fld>
             <a:endParaRPr lang="en-US"/>
           </a:p>
@@ -2388,7 +2388,7 @@
           <a:p>
             <a:fld id="{0EDA919C-F3E3-7543-A7A8-6F0F918CD698}" type="datetimeFigureOut">
               <a:rPr lang="en-US" smtClean="0"/>
-              <a:t>10/29/21</a:t>
+              <a:t>1/6/22</a:t>
             </a:fld>
             <a:endParaRPr lang="en-US"/>
           </a:p>
@@ -2676,7 +2676,7 @@
           <a:p>
             <a:fld id="{0EDA919C-F3E3-7543-A7A8-6F0F918CD698}" type="datetimeFigureOut">
               <a:rPr lang="en-US" smtClean="0"/>
-              <a:t>10/29/21</a:t>
+              <a:t>1/6/22</a:t>
             </a:fld>
             <a:endParaRPr lang="en-US"/>
           </a:p>
@@ -2917,7 +2917,7 @@
           <a:p>
             <a:fld id="{0EDA919C-F3E3-7543-A7A8-6F0F918CD698}" type="datetimeFigureOut">
               <a:rPr lang="en-US" smtClean="0"/>
-              <a:t>10/29/21</a:t>
+              <a:t>1/6/22</a:t>
             </a:fld>
             <a:endParaRPr lang="en-US"/>
           </a:p>
@@ -9758,8 +9758,8 @@
           </a:p>
         </p:txBody>
       </p:sp>
-      <mc:AlternateContent xmlns:mc="http://schemas.openxmlformats.org/markup-compatibility/2006">
-        <mc:Choice xmlns:a14="http://schemas.microsoft.com/office/drawing/2010/main" Requires="a14">
+      <mc:AlternateContent xmlns:mc="http://schemas.openxmlformats.org/markup-compatibility/2006" xmlns:a14="http://schemas.microsoft.com/office/drawing/2010/main">
+        <mc:Choice Requires="a14">
           <p:sp>
             <p:nvSpPr>
               <p:cNvPr id="3" name="Rectangle 2">
@@ -9838,27 +9838,7 @@
                         <a:latin typeface="Cambria Math" panose="02040503050406030204" pitchFamily="18" charset="0"/>
                         <a:ea typeface="Cambria Math" panose="02040503050406030204" pitchFamily="18" charset="0"/>
                       </a:rPr>
-                      <m:t>=</m:t>
-                    </m:r>
-                    <m:r>
-                      <a:rPr lang="en-US" sz="2400" i="1">
-                        <a:solidFill>
-                          <a:schemeClr val="accent1"/>
-                        </a:solidFill>
-                        <a:latin typeface="Cambria Math" panose="02040503050406030204" pitchFamily="18" charset="0"/>
-                        <a:ea typeface="Cambria Math" panose="02040503050406030204" pitchFamily="18" charset="0"/>
-                      </a:rPr>
-                      <m:t>5</m:t>
-                    </m:r>
-                    <m:r>
-                      <a:rPr lang="en-US" sz="2400" i="1">
-                        <a:solidFill>
-                          <a:schemeClr val="accent1"/>
-                        </a:solidFill>
-                        <a:latin typeface="Cambria Math" panose="02040503050406030204" pitchFamily="18" charset="0"/>
-                        <a:ea typeface="Cambria Math" panose="02040503050406030204" pitchFamily="18" charset="0"/>
-                      </a:rPr>
-                      <m:t>×1</m:t>
+                      <m:t>=5×1</m:t>
                     </m:r>
                     <m:sSup>
                       <m:sSupPr>
@@ -9893,17 +9873,7 @@
                             <a:latin typeface="Cambria Math" panose="02040503050406030204" pitchFamily="18" charset="0"/>
                             <a:ea typeface="Cambria Math" panose="02040503050406030204" pitchFamily="18" charset="0"/>
                           </a:rPr>
-                          <m:t>−</m:t>
-                        </m:r>
-                        <m:r>
-                          <a:rPr lang="en-US" sz="2400" i="1">
-                            <a:solidFill>
-                              <a:schemeClr val="accent1"/>
-                            </a:solidFill>
-                            <a:latin typeface="Cambria Math" panose="02040503050406030204" pitchFamily="18" charset="0"/>
-                            <a:ea typeface="Cambria Math" panose="02040503050406030204" pitchFamily="18" charset="0"/>
-                          </a:rPr>
-                          <m:t>5</m:t>
+                          <m:t>−5</m:t>
                         </m:r>
                       </m:sup>
                     </m:sSup>
@@ -10111,7 +10081,7 @@
             </p:txBody>
           </p:sp>
         </mc:Choice>
-        <mc:Fallback>
+        <mc:Fallback xmlns="">
           <p:sp>
             <p:nvSpPr>
               <p:cNvPr id="3" name="Rectangle 2">
@@ -10156,8 +10126,8 @@
           </p:sp>
         </mc:Fallback>
       </mc:AlternateContent>
-      <mc:AlternateContent xmlns:mc="http://schemas.openxmlformats.org/markup-compatibility/2006">
-        <mc:Choice xmlns:a14="http://schemas.microsoft.com/office/drawing/2010/main" Requires="a14">
+      <mc:AlternateContent xmlns:mc="http://schemas.openxmlformats.org/markup-compatibility/2006" xmlns:a14="http://schemas.microsoft.com/office/drawing/2010/main">
+        <mc:Choice Requires="a14">
           <p:sp>
             <p:nvSpPr>
               <p:cNvPr id="7" name="Rectangle 6">
@@ -10237,17 +10207,7 @@
                         <a:latin typeface="Cambria Math" panose="02040503050406030204" pitchFamily="18" charset="0"/>
                         <a:ea typeface="Cambria Math" panose="02040503050406030204" pitchFamily="18" charset="0"/>
                       </a:rPr>
-                      <m:t>≡</m:t>
-                    </m:r>
-                    <m:r>
-                      <a:rPr lang="en-US" sz="2400" b="1" i="1">
-                        <a:solidFill>
-                          <a:schemeClr val="accent1"/>
-                        </a:solidFill>
-                        <a:latin typeface="Cambria Math" panose="02040503050406030204" pitchFamily="18" charset="0"/>
-                        <a:ea typeface="Cambria Math" panose="02040503050406030204" pitchFamily="18" charset="0"/>
-                      </a:rPr>
-                      <m:t>−</m:t>
+                      <m:t>≡−</m:t>
                     </m:r>
                     <m:f>
                       <m:fPr>
@@ -10395,7 +10355,7 @@
             </p:txBody>
           </p:sp>
         </mc:Choice>
-        <mc:Fallback>
+        <mc:Fallback xmlns="">
           <p:sp>
             <p:nvSpPr>
               <p:cNvPr id="7" name="Rectangle 6">
@@ -10510,8 +10470,8 @@
           </a:p>
         </p:txBody>
       </p:sp>
-      <mc:AlternateContent xmlns:mc="http://schemas.openxmlformats.org/markup-compatibility/2006">
-        <mc:Choice xmlns:a14="http://schemas.microsoft.com/office/drawing/2010/main" Requires="a14">
+      <mc:AlternateContent xmlns:mc="http://schemas.openxmlformats.org/markup-compatibility/2006" xmlns:a14="http://schemas.microsoft.com/office/drawing/2010/main">
+        <mc:Choice Requires="a14">
           <p:sp>
             <p:nvSpPr>
               <p:cNvPr id="2" name="Rectangle 1">
@@ -11355,7 +11315,7 @@
             </p:txBody>
           </p:sp>
         </mc:Choice>
-        <mc:Fallback>
+        <mc:Fallback xmlns="">
           <p:sp>
             <p:nvSpPr>
               <p:cNvPr id="2" name="Rectangle 1">
@@ -11435,49 +11395,133 @@
           <a:chExt cx="0" cy="0"/>
         </a:xfrm>
       </p:grpSpPr>
-      <p:sp>
-        <p:nvSpPr>
-          <p:cNvPr id="9" name="TextBox 8">
-            <a:extLst>
-              <a:ext uri="{FF2B5EF4-FFF2-40B4-BE49-F238E27FC236}">
-                <a16:creationId xmlns:a16="http://schemas.microsoft.com/office/drawing/2014/main" id="{CCB63A21-7279-9D42-8077-C7DDE7E0E8D4}"/>
-              </a:ext>
-            </a:extLst>
-          </p:cNvPr>
-          <p:cNvSpPr txBox="1"/>
-          <p:nvPr/>
-        </p:nvSpPr>
-        <p:spPr>
-          <a:xfrm>
-            <a:off x="0" y="37474"/>
-            <a:ext cx="8350715" cy="461665"/>
-          </a:xfrm>
-          <a:prstGeom prst="rect">
-            <a:avLst/>
-          </a:prstGeom>
-          <a:noFill/>
-        </p:spPr>
-        <p:txBody>
-          <a:bodyPr wrap="square" rtlCol="0">
-            <a:spAutoFit/>
-          </a:bodyPr>
-          <a:lstStyle/>
-          <a:p>
-            <a:r>
-              <a:rPr lang="en-US" sz="2400" b="1" dirty="0"/>
-              <a:t>4. Deriving </a:t>
-            </a:r>
-            <a:r>
-              <a:rPr lang="en-US" sz="2400" b="1" dirty="0" err="1"/>
-              <a:t>Blagdon’s</a:t>
-            </a:r>
-            <a:r>
-              <a:rPr lang="en-US" sz="2400" b="1" dirty="0"/>
-              <a:t> Law by dimensional analysis</a:t>
-            </a:r>
-          </a:p>
-        </p:txBody>
-      </p:sp>
+      <mc:AlternateContent xmlns:mc="http://schemas.openxmlformats.org/markup-compatibility/2006">
+        <mc:Choice xmlns:a14="http://schemas.microsoft.com/office/drawing/2010/main" Requires="a14">
+          <p:sp>
+            <p:nvSpPr>
+              <p:cNvPr id="9" name="TextBox 8">
+                <a:extLst>
+                  <a:ext uri="{FF2B5EF4-FFF2-40B4-BE49-F238E27FC236}">
+                    <a16:creationId xmlns:a16="http://schemas.microsoft.com/office/drawing/2014/main" id="{CCB63A21-7279-9D42-8077-C7DDE7E0E8D4}"/>
+                  </a:ext>
+                </a:extLst>
+              </p:cNvPr>
+              <p:cNvSpPr txBox="1"/>
+              <p:nvPr/>
+            </p:nvSpPr>
+            <p:spPr>
+              <a:xfrm>
+                <a:off x="0" y="37474"/>
+                <a:ext cx="10680715" cy="461665"/>
+              </a:xfrm>
+              <a:prstGeom prst="rect">
+                <a:avLst/>
+              </a:prstGeom>
+              <a:noFill/>
+            </p:spPr>
+            <p:txBody>
+              <a:bodyPr wrap="square" rtlCol="0">
+                <a:spAutoFit/>
+              </a:bodyPr>
+              <a:lstStyle/>
+              <a:p>
+                <a:r>
+                  <a:rPr lang="en-US" sz="2400" b="1" dirty="0"/>
+                  <a:t>4. Deriving the </a:t>
+                </a:r>
+                <a:r>
+                  <a:rPr lang="en-US" sz="2400" b="1" dirty="0" err="1"/>
+                  <a:t>cryoscopic</a:t>
+                </a:r>
+                <a:r>
+                  <a:rPr lang="en-US" sz="2400" b="1" dirty="0"/>
+                  <a:t> constant </a:t>
+                </a:r>
+                <a14:m>
+                  <m:oMath xmlns:m="http://schemas.openxmlformats.org/officeDocument/2006/math">
+                    <m:sSub>
+                      <m:sSubPr>
+                        <m:ctrlPr>
+                          <a:rPr lang="en-US" sz="2400" b="1" i="1">
+                            <a:latin typeface="Cambria Math" panose="02040503050406030204" pitchFamily="18" charset="0"/>
+                            <a:ea typeface="Cambria Math" panose="02040503050406030204" pitchFamily="18" charset="0"/>
+                          </a:rPr>
+                        </m:ctrlPr>
+                      </m:sSubPr>
+                      <m:e>
+                        <m:r>
+                          <a:rPr lang="en-US" sz="2400" b="1" i="1">
+                            <a:latin typeface="Cambria Math" panose="02040503050406030204" pitchFamily="18" charset="0"/>
+                            <a:ea typeface="Cambria Math" panose="02040503050406030204" pitchFamily="18" charset="0"/>
+                          </a:rPr>
+                          <m:t>𝑲</m:t>
+                        </m:r>
+                      </m:e>
+                      <m:sub>
+                        <m:r>
+                          <a:rPr lang="en-US" sz="2400" b="1" i="1">
+                            <a:latin typeface="Cambria Math" panose="02040503050406030204" pitchFamily="18" charset="0"/>
+                            <a:ea typeface="Cambria Math" panose="02040503050406030204" pitchFamily="18" charset="0"/>
+                          </a:rPr>
+                          <m:t>𝑨</m:t>
+                        </m:r>
+                      </m:sub>
+                    </m:sSub>
+                  </m:oMath>
+                </a14:m>
+                <a:r>
+                  <a:rPr lang="en-US" sz="2400" b="1" dirty="0"/>
+                  <a:t> using dimensional analysis</a:t>
+                </a:r>
+              </a:p>
+            </p:txBody>
+          </p:sp>
+        </mc:Choice>
+        <mc:Fallback>
+          <p:sp>
+            <p:nvSpPr>
+              <p:cNvPr id="9" name="TextBox 8">
+                <a:extLst>
+                  <a:ext uri="{FF2B5EF4-FFF2-40B4-BE49-F238E27FC236}">
+                    <a16:creationId xmlns:a16="http://schemas.microsoft.com/office/drawing/2014/main" id="{CCB63A21-7279-9D42-8077-C7DDE7E0E8D4}"/>
+                  </a:ext>
+                </a:extLst>
+              </p:cNvPr>
+              <p:cNvSpPr txBox="1">
+                <a:spLocks noRot="1" noChangeAspect="1" noMove="1" noResize="1" noEditPoints="1" noAdjustHandles="1" noChangeArrowheads="1" noChangeShapeType="1" noTextEdit="1"/>
+              </p:cNvSpPr>
+              <p:nvPr/>
+            </p:nvSpPr>
+            <p:spPr>
+              <a:xfrm>
+                <a:off x="0" y="37474"/>
+                <a:ext cx="10680715" cy="461665"/>
+              </a:xfrm>
+              <a:prstGeom prst="rect">
+                <a:avLst/>
+              </a:prstGeom>
+              <a:blipFill>
+                <a:blip r:embed="rId2"/>
+                <a:stretch>
+                  <a:fillRect l="-951" t="-5263" b="-28947"/>
+                </a:stretch>
+              </a:blipFill>
+            </p:spPr>
+            <p:txBody>
+              <a:bodyPr/>
+              <a:lstStyle/>
+              <a:p>
+                <a:r>
+                  <a:rPr lang="en-US">
+                    <a:noFill/>
+                  </a:rPr>
+                  <a:t> </a:t>
+                </a:r>
+              </a:p>
+            </p:txBody>
+          </p:sp>
+        </mc:Fallback>
+      </mc:AlternateContent>
       <p:grpSp>
         <p:nvGrpSpPr>
           <p:cNvPr id="4" name="Group 3">
@@ -11533,7 +11577,7 @@
               <p:nvPr/>
             </p:nvPicPr>
             <p:blipFill rotWithShape="1">
-              <a:blip r:embed="rId2">
+              <a:blip r:embed="rId3">
                 <a:extLst>
                   <a:ext uri="{28A0092B-C50C-407E-A947-70E740481C1C}">
                     <a14:useLocalDpi xmlns:a14="http://schemas.microsoft.com/office/drawing/2010/main" val="0"/>
@@ -11772,8 +11816,8 @@
           </p:txBody>
         </p:sp>
       </p:grpSp>
-      <mc:AlternateContent xmlns:mc="http://schemas.openxmlformats.org/markup-compatibility/2006" xmlns:a14="http://schemas.microsoft.com/office/drawing/2010/main">
-        <mc:Choice Requires="a14">
+      <mc:AlternateContent xmlns:mc="http://schemas.openxmlformats.org/markup-compatibility/2006">
+        <mc:Choice xmlns:a14="http://schemas.microsoft.com/office/drawing/2010/main" Requires="a14">
           <p:sp>
             <p:nvSpPr>
               <p:cNvPr id="3" name="TextBox 2">
@@ -11788,8 +11832,8 @@
             </p:nvSpPr>
             <p:spPr>
               <a:xfrm>
-                <a:off x="4310614" y="646782"/>
-                <a:ext cx="7628599" cy="3475118"/>
+                <a:off x="4310614" y="1737025"/>
+                <a:ext cx="7628599" cy="1107996"/>
               </a:xfrm>
               <a:prstGeom prst="rect">
                 <a:avLst/>
@@ -11802,13 +11846,9 @@
               </a:bodyPr>
               <a:lstStyle/>
               <a:p>
-                <a:pPr marL="342900" indent="-342900">
-                  <a:buFont typeface="Arial" panose="020B0604020202020204" pitchFamily="34" charset="0"/>
-                  <a:buChar char="•"/>
-                </a:pPr>
                 <a:r>
                   <a:rPr lang="en-US" sz="2200" dirty="0"/>
-                  <a:t>You already showed that  </a:t>
+                  <a:t>Blagden says </a:t>
                 </a:r>
                 <a14:m>
                   <m:oMath xmlns:m="http://schemas.openxmlformats.org/officeDocument/2006/math">
@@ -11848,11 +11888,46 @@
                       </m:sub>
                     </m:sSub>
                     <m:r>
-                      <a:rPr lang="en-US" sz="2200" b="1" i="1">
+                      <a:rPr lang="en-US" sz="2200" b="1" i="1" smtClean="0">
                         <a:latin typeface="Cambria Math" panose="02040503050406030204" pitchFamily="18" charset="0"/>
                         <a:ea typeface="Cambria Math" panose="02040503050406030204" pitchFamily="18" charset="0"/>
                       </a:rPr>
-                      <m:t>∝</m:t>
+                      <m:t>=</m:t>
+                    </m:r>
+                    <m:sSub>
+                      <m:sSubPr>
+                        <m:ctrlPr>
+                          <a:rPr lang="en-US" sz="2200" b="1" i="1" smtClean="0">
+                            <a:latin typeface="Cambria Math" panose="02040503050406030204" pitchFamily="18" charset="0"/>
+                            <a:ea typeface="Cambria Math" panose="02040503050406030204" pitchFamily="18" charset="0"/>
+                          </a:rPr>
+                        </m:ctrlPr>
+                      </m:sSubPr>
+                      <m:e>
+                        <m:r>
+                          <a:rPr lang="en-US" sz="2200" b="1" i="1" smtClean="0">
+                            <a:latin typeface="Cambria Math" panose="02040503050406030204" pitchFamily="18" charset="0"/>
+                            <a:ea typeface="Cambria Math" panose="02040503050406030204" pitchFamily="18" charset="0"/>
+                          </a:rPr>
+                          <m:t>𝑲</m:t>
+                        </m:r>
+                      </m:e>
+                      <m:sub>
+                        <m:r>
+                          <a:rPr lang="en-US" sz="2200" b="1" i="1" smtClean="0">
+                            <a:latin typeface="Cambria Math" panose="02040503050406030204" pitchFamily="18" charset="0"/>
+                            <a:ea typeface="Cambria Math" panose="02040503050406030204" pitchFamily="18" charset="0"/>
+                          </a:rPr>
+                          <m:t>𝑨</m:t>
+                        </m:r>
+                      </m:sub>
+                    </m:sSub>
+                    <m:r>
+                      <a:rPr lang="en-US" sz="2200" b="1" i="1" smtClean="0">
+                        <a:latin typeface="Cambria Math" panose="02040503050406030204" pitchFamily="18" charset="0"/>
+                        <a:ea typeface="Cambria Math" panose="02040503050406030204" pitchFamily="18" charset="0"/>
+                      </a:rPr>
+                      <m:t> </m:t>
                     </m:r>
                     <m:sSub>
                       <m:sSubPr>
@@ -11894,125 +11969,7 @@
                   <a:rPr lang="en-US" sz="2200" b="1" dirty="0"/>
                   <a:t> </a:t>
                 </a:r>
-              </a:p>
-              <a:p>
-                <a:endParaRPr lang="en-US" sz="2200" b="1" dirty="0"/>
-              </a:p>
-              <a:p>
-                <a:pPr marL="342900" indent="-342900">
-                  <a:buFont typeface="Arial" panose="020B0604020202020204" pitchFamily="34" charset="0"/>
-                  <a:buChar char="•"/>
-                </a:pPr>
-                <a:r>
-                  <a:rPr lang="en-US" sz="2200" dirty="0"/>
-                  <a:t>It’s reasonable to guess that </a:t>
-                </a:r>
-                <a14:m>
-                  <m:oMath xmlns:m="http://schemas.openxmlformats.org/officeDocument/2006/math">
-                    <m:r>
-                      <a:rPr lang="en-US" sz="2200" b="1" i="1">
-                        <a:latin typeface="Cambria Math" panose="02040503050406030204" pitchFamily="18" charset="0"/>
-                        <a:ea typeface="Cambria Math" panose="02040503050406030204" pitchFamily="18" charset="0"/>
-                      </a:rPr>
-                      <m:t>∆</m:t>
-                    </m:r>
-                    <m:sSub>
-                      <m:sSubPr>
-                        <m:ctrlPr>
-                          <a:rPr lang="en-US" sz="2200" b="1" i="1">
-                            <a:latin typeface="Cambria Math" panose="02040503050406030204" pitchFamily="18" charset="0"/>
-                            <a:ea typeface="Cambria Math" panose="02040503050406030204" pitchFamily="18" charset="0"/>
-                          </a:rPr>
-                        </m:ctrlPr>
-                      </m:sSubPr>
-                      <m:e>
-                        <m:r>
-                          <a:rPr lang="en-US" sz="2200" b="1" i="1">
-                            <a:latin typeface="Cambria Math" panose="02040503050406030204" pitchFamily="18" charset="0"/>
-                            <a:ea typeface="Cambria Math" panose="02040503050406030204" pitchFamily="18" charset="0"/>
-                          </a:rPr>
-                          <m:t>𝑻</m:t>
-                        </m:r>
-                      </m:e>
-                      <m:sub>
-                        <m:r>
-                          <a:rPr lang="en-US" sz="2200" b="1" i="1">
-                            <a:latin typeface="Cambria Math" panose="02040503050406030204" pitchFamily="18" charset="0"/>
-                            <a:ea typeface="Cambria Math" panose="02040503050406030204" pitchFamily="18" charset="0"/>
-                          </a:rPr>
-                          <m:t>𝑭</m:t>
-                        </m:r>
-                      </m:sub>
-                    </m:sSub>
-                    <m:r>
-                      <a:rPr lang="en-US" sz="2200" b="1" i="1" smtClean="0">
-                        <a:latin typeface="Cambria Math" panose="02040503050406030204" pitchFamily="18" charset="0"/>
-                        <a:ea typeface="Cambria Math" panose="02040503050406030204" pitchFamily="18" charset="0"/>
-                      </a:rPr>
-                      <m:t>∝</m:t>
-                    </m:r>
-                    <m:f>
-                      <m:fPr>
-                        <m:ctrlPr>
-                          <a:rPr lang="en-US" sz="2200" b="1" i="1" smtClean="0">
-                            <a:latin typeface="Cambria Math" panose="02040503050406030204" pitchFamily="18" charset="0"/>
-                            <a:ea typeface="Cambria Math" panose="02040503050406030204" pitchFamily="18" charset="0"/>
-                          </a:rPr>
-                        </m:ctrlPr>
-                      </m:fPr>
-                      <m:num>
-                        <m:r>
-                          <a:rPr lang="en-US" sz="2200" b="1" i="1" smtClean="0">
-                            <a:latin typeface="Cambria Math" panose="02040503050406030204" pitchFamily="18" charset="0"/>
-                            <a:ea typeface="Cambria Math" panose="02040503050406030204" pitchFamily="18" charset="0"/>
-                          </a:rPr>
-                          <m:t>𝟏</m:t>
-                        </m:r>
-                      </m:num>
-                      <m:den>
-                        <m:r>
-                          <a:rPr lang="en-US" sz="2200" b="1" i="1">
-                            <a:latin typeface="Cambria Math" panose="02040503050406030204" pitchFamily="18" charset="0"/>
-                            <a:ea typeface="Cambria Math" panose="02040503050406030204" pitchFamily="18" charset="0"/>
-                          </a:rPr>
-                          <m:t>∆</m:t>
-                        </m:r>
-                        <m:sSub>
-                          <m:sSubPr>
-                            <m:ctrlPr>
-                              <a:rPr lang="en-US" sz="2200" b="1" i="1">
-                                <a:latin typeface="Cambria Math" panose="02040503050406030204" pitchFamily="18" charset="0"/>
-                                <a:ea typeface="Cambria Math" panose="02040503050406030204" pitchFamily="18" charset="0"/>
-                              </a:rPr>
-                            </m:ctrlPr>
-                          </m:sSubPr>
-                          <m:e>
-                            <m:r>
-                              <a:rPr lang="en-US" sz="2200" b="1" i="1">
-                                <a:latin typeface="Cambria Math" panose="02040503050406030204" pitchFamily="18" charset="0"/>
-                                <a:ea typeface="Cambria Math" panose="02040503050406030204" pitchFamily="18" charset="0"/>
-                              </a:rPr>
-                              <m:t>𝑯</m:t>
-                            </m:r>
-                          </m:e>
-                          <m:sub>
-                            <m:r>
-                              <a:rPr lang="en-US" sz="2200" b="1" i="1">
-                                <a:latin typeface="Cambria Math" panose="02040503050406030204" pitchFamily="18" charset="0"/>
-                                <a:ea typeface="Cambria Math" panose="02040503050406030204" pitchFamily="18" charset="0"/>
-                              </a:rPr>
-                              <m:t>𝒇𝒖𝒔</m:t>
-                            </m:r>
-                          </m:sub>
-                        </m:sSub>
-                      </m:den>
-                    </m:f>
-                  </m:oMath>
-                </a14:m>
-                <a:r>
-                  <a:rPr lang="en-US" sz="2200" dirty="0"/>
-                  <a:t>. </a:t>
-                </a:r>
+                <a:endParaRPr lang="en-US" sz="2200" dirty="0"/>
               </a:p>
               <a:p>
                 <a:pPr marL="342900" indent="-342900">
@@ -12021,377 +11978,10 @@
                 </a:pPr>
                 <a:endParaRPr lang="en-US" sz="2200" dirty="0"/>
               </a:p>
-              <a:p>
-                <a:pPr lvl="1"/>
-                <a:r>
-                  <a:rPr lang="en-US" sz="2000" i="1" dirty="0"/>
-                  <a:t>Why? </a:t>
-                </a:r>
-                <a14:m>
-                  <m:oMath xmlns:m="http://schemas.openxmlformats.org/officeDocument/2006/math">
-                    <m:r>
-                      <a:rPr lang="en-US" sz="2000" i="1">
-                        <a:latin typeface="Cambria Math" panose="02040503050406030204" pitchFamily="18" charset="0"/>
-                        <a:ea typeface="Cambria Math" panose="02040503050406030204" pitchFamily="18" charset="0"/>
-                      </a:rPr>
-                      <m:t>∆</m:t>
-                    </m:r>
-                    <m:sSub>
-                      <m:sSubPr>
-                        <m:ctrlPr>
-                          <a:rPr lang="en-US" sz="2000" i="1">
-                            <a:latin typeface="Cambria Math" panose="02040503050406030204" pitchFamily="18" charset="0"/>
-                            <a:ea typeface="Cambria Math" panose="02040503050406030204" pitchFamily="18" charset="0"/>
-                          </a:rPr>
-                        </m:ctrlPr>
-                      </m:sSubPr>
-                      <m:e>
-                        <m:r>
-                          <a:rPr lang="en-US" sz="2000" i="1">
-                            <a:latin typeface="Cambria Math" panose="02040503050406030204" pitchFamily="18" charset="0"/>
-                            <a:ea typeface="Cambria Math" panose="02040503050406030204" pitchFamily="18" charset="0"/>
-                          </a:rPr>
-                          <m:t>𝑇</m:t>
-                        </m:r>
-                      </m:e>
-                      <m:sub>
-                        <m:r>
-                          <a:rPr lang="en-US" sz="2000" i="1">
-                            <a:latin typeface="Cambria Math" panose="02040503050406030204" pitchFamily="18" charset="0"/>
-                            <a:ea typeface="Cambria Math" panose="02040503050406030204" pitchFamily="18" charset="0"/>
-                          </a:rPr>
-                          <m:t>𝐹</m:t>
-                        </m:r>
-                      </m:sub>
-                    </m:sSub>
-                  </m:oMath>
-                </a14:m>
-                <a:r>
-                  <a:rPr lang="en-US" sz="2000" i="1" dirty="0"/>
-                  <a:t> will be </a:t>
-                </a:r>
-                <a:r>
-                  <a:rPr lang="en-US" sz="2000" b="1" i="1" dirty="0"/>
-                  <a:t>bigger</a:t>
-                </a:r>
-                <a:r>
-                  <a:rPr lang="en-US" sz="2000" i="1" dirty="0"/>
-                  <a:t> when the difference between sublimation and vaporization slopes is </a:t>
-                </a:r>
-                <a:r>
-                  <a:rPr lang="en-US" sz="2000" b="1" i="1" dirty="0"/>
-                  <a:t>small</a:t>
-                </a:r>
-                <a:r>
-                  <a:rPr lang="en-US" sz="2000" i="1" dirty="0"/>
-                  <a:t>. According to Clapeyron, these slopes are </a:t>
-                </a:r>
-                <a14:m>
-                  <m:oMath xmlns:m="http://schemas.openxmlformats.org/officeDocument/2006/math">
-                    <m:f>
-                      <m:fPr>
-                        <m:ctrlPr>
-                          <a:rPr lang="en-US" sz="2000" b="0" i="1" smtClean="0">
-                            <a:latin typeface="Cambria Math" panose="02040503050406030204" pitchFamily="18" charset="0"/>
-                            <a:ea typeface="Cambria Math" panose="02040503050406030204" pitchFamily="18" charset="0"/>
-                          </a:rPr>
-                        </m:ctrlPr>
-                      </m:fPr>
-                      <m:num>
-                        <m:r>
-                          <a:rPr lang="en-US" sz="2000" b="0" i="1" smtClean="0">
-                            <a:latin typeface="Cambria Math" panose="02040503050406030204" pitchFamily="18" charset="0"/>
-                            <a:ea typeface="Cambria Math" panose="02040503050406030204" pitchFamily="18" charset="0"/>
-                          </a:rPr>
-                          <m:t>∆</m:t>
-                        </m:r>
-                        <m:sSub>
-                          <m:sSubPr>
-                            <m:ctrlPr>
-                              <a:rPr lang="en-US" sz="2000" b="0" i="1" smtClean="0">
-                                <a:latin typeface="Cambria Math" panose="02040503050406030204" pitchFamily="18" charset="0"/>
-                                <a:ea typeface="Cambria Math" panose="02040503050406030204" pitchFamily="18" charset="0"/>
-                              </a:rPr>
-                            </m:ctrlPr>
-                          </m:sSubPr>
-                          <m:e>
-                            <m:r>
-                              <a:rPr lang="en-US" sz="2000" b="0" i="1" smtClean="0">
-                                <a:latin typeface="Cambria Math" panose="02040503050406030204" pitchFamily="18" charset="0"/>
-                                <a:ea typeface="Cambria Math" panose="02040503050406030204" pitchFamily="18" charset="0"/>
-                              </a:rPr>
-                              <m:t>𝐻</m:t>
-                            </m:r>
-                          </m:e>
-                          <m:sub>
-                            <m:r>
-                              <a:rPr lang="en-US" sz="2000" b="0" i="1" smtClean="0">
-                                <a:latin typeface="Cambria Math" panose="02040503050406030204" pitchFamily="18" charset="0"/>
-                                <a:ea typeface="Cambria Math" panose="02040503050406030204" pitchFamily="18" charset="0"/>
-                              </a:rPr>
-                              <m:t>𝑠𝑢𝑏</m:t>
-                            </m:r>
-                          </m:sub>
-                        </m:sSub>
-                        <m:sSub>
-                          <m:sSubPr>
-                            <m:ctrlPr>
-                              <a:rPr lang="en-US" sz="2000" b="0" i="1" smtClean="0">
-                                <a:latin typeface="Cambria Math" panose="02040503050406030204" pitchFamily="18" charset="0"/>
-                                <a:ea typeface="Cambria Math" panose="02040503050406030204" pitchFamily="18" charset="0"/>
-                              </a:rPr>
-                            </m:ctrlPr>
-                          </m:sSubPr>
-                          <m:e>
-                            <m:r>
-                              <a:rPr lang="en-US" sz="2000" b="0" i="1" smtClean="0">
-                                <a:latin typeface="Cambria Math" panose="02040503050406030204" pitchFamily="18" charset="0"/>
-                                <a:ea typeface="Cambria Math" panose="02040503050406030204" pitchFamily="18" charset="0"/>
-                              </a:rPr>
-                              <m:t>𝑃</m:t>
-                            </m:r>
-                          </m:e>
-                          <m:sub>
-                            <m:r>
-                              <a:rPr lang="en-US" sz="2000" b="0" i="1" smtClean="0">
-                                <a:latin typeface="Cambria Math" panose="02040503050406030204" pitchFamily="18" charset="0"/>
-                                <a:ea typeface="Cambria Math" panose="02040503050406030204" pitchFamily="18" charset="0"/>
-                              </a:rPr>
-                              <m:t>3</m:t>
-                            </m:r>
-                          </m:sub>
-                        </m:sSub>
-                      </m:num>
-                      <m:den>
-                        <m:sSubSup>
-                          <m:sSubSupPr>
-                            <m:ctrlPr>
-                              <a:rPr lang="en-US" sz="2000" b="0" i="1" smtClean="0">
-                                <a:latin typeface="Cambria Math" panose="02040503050406030204" pitchFamily="18" charset="0"/>
-                                <a:ea typeface="Cambria Math" panose="02040503050406030204" pitchFamily="18" charset="0"/>
-                              </a:rPr>
-                            </m:ctrlPr>
-                          </m:sSubSupPr>
-                          <m:e>
-                            <m:r>
-                              <a:rPr lang="en-US" sz="2000" b="0" i="1" smtClean="0">
-                                <a:latin typeface="Cambria Math" panose="02040503050406030204" pitchFamily="18" charset="0"/>
-                                <a:ea typeface="Cambria Math" panose="02040503050406030204" pitchFamily="18" charset="0"/>
-                              </a:rPr>
-                              <m:t>𝑇</m:t>
-                            </m:r>
-                          </m:e>
-                          <m:sub>
-                            <m:r>
-                              <a:rPr lang="en-US" sz="2000" b="0" i="1" smtClean="0">
-                                <a:latin typeface="Cambria Math" panose="02040503050406030204" pitchFamily="18" charset="0"/>
-                                <a:ea typeface="Cambria Math" panose="02040503050406030204" pitchFamily="18" charset="0"/>
-                              </a:rPr>
-                              <m:t>3</m:t>
-                            </m:r>
-                          </m:sub>
-                          <m:sup>
-                            <m:r>
-                              <a:rPr lang="en-US" sz="2000" b="0" i="1" smtClean="0">
-                                <a:latin typeface="Cambria Math" panose="02040503050406030204" pitchFamily="18" charset="0"/>
-                                <a:ea typeface="Cambria Math" panose="02040503050406030204" pitchFamily="18" charset="0"/>
-                              </a:rPr>
-                              <m:t>2</m:t>
-                            </m:r>
-                          </m:sup>
-                        </m:sSubSup>
-                        <m:r>
-                          <a:rPr lang="en-US" sz="2000" b="0" i="1" smtClean="0">
-                            <a:latin typeface="Cambria Math" panose="02040503050406030204" pitchFamily="18" charset="0"/>
-                            <a:ea typeface="Cambria Math" panose="02040503050406030204" pitchFamily="18" charset="0"/>
-                          </a:rPr>
-                          <m:t>𝑅</m:t>
-                        </m:r>
-                      </m:den>
-                    </m:f>
-                  </m:oMath>
-                </a14:m>
-                <a:r>
-                  <a:rPr lang="en-US" sz="2000" i="1" dirty="0"/>
-                  <a:t> and </a:t>
-                </a:r>
-                <a14:m>
-                  <m:oMath xmlns:m="http://schemas.openxmlformats.org/officeDocument/2006/math">
-                    <m:f>
-                      <m:fPr>
-                        <m:ctrlPr>
-                          <a:rPr lang="en-US" sz="2000" i="1">
-                            <a:latin typeface="Cambria Math" panose="02040503050406030204" pitchFamily="18" charset="0"/>
-                            <a:ea typeface="Cambria Math" panose="02040503050406030204" pitchFamily="18" charset="0"/>
-                          </a:rPr>
-                        </m:ctrlPr>
-                      </m:fPr>
-                      <m:num>
-                        <m:r>
-                          <a:rPr lang="en-US" sz="2000" i="1">
-                            <a:latin typeface="Cambria Math" panose="02040503050406030204" pitchFamily="18" charset="0"/>
-                            <a:ea typeface="Cambria Math" panose="02040503050406030204" pitchFamily="18" charset="0"/>
-                          </a:rPr>
-                          <m:t>∆</m:t>
-                        </m:r>
-                        <m:sSub>
-                          <m:sSubPr>
-                            <m:ctrlPr>
-                              <a:rPr lang="en-US" sz="2000" i="1">
-                                <a:latin typeface="Cambria Math" panose="02040503050406030204" pitchFamily="18" charset="0"/>
-                                <a:ea typeface="Cambria Math" panose="02040503050406030204" pitchFamily="18" charset="0"/>
-                              </a:rPr>
-                            </m:ctrlPr>
-                          </m:sSubPr>
-                          <m:e>
-                            <m:r>
-                              <a:rPr lang="en-US" sz="2000" i="1">
-                                <a:latin typeface="Cambria Math" panose="02040503050406030204" pitchFamily="18" charset="0"/>
-                                <a:ea typeface="Cambria Math" panose="02040503050406030204" pitchFamily="18" charset="0"/>
-                              </a:rPr>
-                              <m:t>𝐻</m:t>
-                            </m:r>
-                          </m:e>
-                          <m:sub>
-                            <m:r>
-                              <a:rPr lang="en-US" sz="2000" b="0" i="1" smtClean="0">
-                                <a:latin typeface="Cambria Math" panose="02040503050406030204" pitchFamily="18" charset="0"/>
-                                <a:ea typeface="Cambria Math" panose="02040503050406030204" pitchFamily="18" charset="0"/>
-                              </a:rPr>
-                              <m:t>𝑣𝑎𝑝</m:t>
-                            </m:r>
-                          </m:sub>
-                        </m:sSub>
-                        <m:sSub>
-                          <m:sSubPr>
-                            <m:ctrlPr>
-                              <a:rPr lang="en-US" sz="2000" b="0" i="1" smtClean="0">
-                                <a:latin typeface="Cambria Math" panose="02040503050406030204" pitchFamily="18" charset="0"/>
-                                <a:ea typeface="Cambria Math" panose="02040503050406030204" pitchFamily="18" charset="0"/>
-                              </a:rPr>
-                            </m:ctrlPr>
-                          </m:sSubPr>
-                          <m:e>
-                            <m:r>
-                              <a:rPr lang="en-US" sz="2000" i="1">
-                                <a:latin typeface="Cambria Math" panose="02040503050406030204" pitchFamily="18" charset="0"/>
-                                <a:ea typeface="Cambria Math" panose="02040503050406030204" pitchFamily="18" charset="0"/>
-                              </a:rPr>
-                              <m:t>𝑃</m:t>
-                            </m:r>
-                          </m:e>
-                          <m:sub>
-                            <m:r>
-                              <a:rPr lang="en-US" sz="2000" b="0" i="1" smtClean="0">
-                                <a:latin typeface="Cambria Math" panose="02040503050406030204" pitchFamily="18" charset="0"/>
-                                <a:ea typeface="Cambria Math" panose="02040503050406030204" pitchFamily="18" charset="0"/>
-                              </a:rPr>
-                              <m:t>3</m:t>
-                            </m:r>
-                          </m:sub>
-                        </m:sSub>
-                      </m:num>
-                      <m:den>
-                        <m:sSubSup>
-                          <m:sSubSupPr>
-                            <m:ctrlPr>
-                              <a:rPr lang="en-US" sz="2000" b="0" i="1" smtClean="0">
-                                <a:latin typeface="Cambria Math" panose="02040503050406030204" pitchFamily="18" charset="0"/>
-                                <a:ea typeface="Cambria Math" panose="02040503050406030204" pitchFamily="18" charset="0"/>
-                              </a:rPr>
-                            </m:ctrlPr>
-                          </m:sSubSupPr>
-                          <m:e>
-                            <m:r>
-                              <a:rPr lang="en-US" sz="2000" i="1">
-                                <a:latin typeface="Cambria Math" panose="02040503050406030204" pitchFamily="18" charset="0"/>
-                                <a:ea typeface="Cambria Math" panose="02040503050406030204" pitchFamily="18" charset="0"/>
-                              </a:rPr>
-                              <m:t>𝑇</m:t>
-                            </m:r>
-                          </m:e>
-                          <m:sub>
-                            <m:r>
-                              <a:rPr lang="en-US" sz="2000" b="0" i="1" smtClean="0">
-                                <a:latin typeface="Cambria Math" panose="02040503050406030204" pitchFamily="18" charset="0"/>
-                                <a:ea typeface="Cambria Math" panose="02040503050406030204" pitchFamily="18" charset="0"/>
-                              </a:rPr>
-                              <m:t>3</m:t>
-                            </m:r>
-                          </m:sub>
-                          <m:sup>
-                            <m:r>
-                              <a:rPr lang="en-US" sz="2000" i="1">
-                                <a:latin typeface="Cambria Math" panose="02040503050406030204" pitchFamily="18" charset="0"/>
-                                <a:ea typeface="Cambria Math" panose="02040503050406030204" pitchFamily="18" charset="0"/>
-                              </a:rPr>
-                              <m:t>2</m:t>
-                            </m:r>
-                          </m:sup>
-                        </m:sSubSup>
-                        <m:r>
-                          <a:rPr lang="en-US" sz="2000" i="1">
-                            <a:latin typeface="Cambria Math" panose="02040503050406030204" pitchFamily="18" charset="0"/>
-                            <a:ea typeface="Cambria Math" panose="02040503050406030204" pitchFamily="18" charset="0"/>
-                          </a:rPr>
-                          <m:t>𝑅</m:t>
-                        </m:r>
-                      </m:den>
-                    </m:f>
-                  </m:oMath>
-                </a14:m>
-                <a:r>
-                  <a:rPr lang="en-US" sz="2000" i="1" dirty="0"/>
-                  <a:t> at the triple point, so the difference between slopes is </a:t>
-                </a:r>
-                <a14:m>
-                  <m:oMath xmlns:m="http://schemas.openxmlformats.org/officeDocument/2006/math">
-                    <m:r>
-                      <a:rPr lang="en-US" sz="2000" i="1">
-                        <a:latin typeface="Cambria Math" panose="02040503050406030204" pitchFamily="18" charset="0"/>
-                        <a:ea typeface="Cambria Math" panose="02040503050406030204" pitchFamily="18" charset="0"/>
-                      </a:rPr>
-                      <m:t>∝∆</m:t>
-                    </m:r>
-                    <m:sSub>
-                      <m:sSubPr>
-                        <m:ctrlPr>
-                          <a:rPr lang="en-US" sz="2000" i="1">
-                            <a:latin typeface="Cambria Math" panose="02040503050406030204" pitchFamily="18" charset="0"/>
-                            <a:ea typeface="Cambria Math" panose="02040503050406030204" pitchFamily="18" charset="0"/>
-                          </a:rPr>
-                        </m:ctrlPr>
-                      </m:sSubPr>
-                      <m:e>
-                        <m:r>
-                          <a:rPr lang="en-US" sz="2000" i="1">
-                            <a:latin typeface="Cambria Math" panose="02040503050406030204" pitchFamily="18" charset="0"/>
-                            <a:ea typeface="Cambria Math" panose="02040503050406030204" pitchFamily="18" charset="0"/>
-                          </a:rPr>
-                          <m:t>𝐻</m:t>
-                        </m:r>
-                      </m:e>
-                      <m:sub>
-                        <m:r>
-                          <a:rPr lang="en-US" sz="2000" i="1">
-                            <a:latin typeface="Cambria Math" panose="02040503050406030204" pitchFamily="18" charset="0"/>
-                            <a:ea typeface="Cambria Math" panose="02040503050406030204" pitchFamily="18" charset="0"/>
-                          </a:rPr>
-                          <m:t>𝑓𝑢𝑠</m:t>
-                        </m:r>
-                      </m:sub>
-                    </m:sSub>
-                  </m:oMath>
-                </a14:m>
-                <a:r>
-                  <a:rPr lang="en-US" sz="2000" i="1" dirty="0"/>
-                  <a:t>.  </a:t>
-                </a:r>
-              </a:p>
             </p:txBody>
           </p:sp>
         </mc:Choice>
-        <mc:Fallback xmlns="">
+        <mc:Fallback>
           <p:sp>
             <p:nvSpPr>
               <p:cNvPr id="3" name="TextBox 2">
@@ -12408,16 +11998,16 @@
             </p:nvSpPr>
             <p:spPr>
               <a:xfrm>
-                <a:off x="4310614" y="646782"/>
-                <a:ext cx="7628599" cy="3475118"/>
+                <a:off x="4310614" y="1737025"/>
+                <a:ext cx="7628599" cy="1107996"/>
               </a:xfrm>
               <a:prstGeom prst="rect">
                 <a:avLst/>
               </a:prstGeom>
               <a:blipFill>
-                <a:blip r:embed="rId3"/>
+                <a:blip r:embed="rId4"/>
                 <a:stretch>
-                  <a:fillRect l="-831" t="-727" b="-1455"/>
+                  <a:fillRect l="-997" t="-3371"/>
                 </a:stretch>
               </a:blipFill>
             </p:spPr>
@@ -12502,7 +12092,7 @@
         </p:nvGrpSpPr>
         <p:grpSpPr>
           <a:xfrm>
-            <a:off x="9329819" y="199136"/>
+            <a:off x="9329819" y="1289379"/>
             <a:ext cx="2419912" cy="1485178"/>
             <a:chOff x="6594134" y="3406843"/>
             <a:chExt cx="4086660" cy="2859837"/>
@@ -13181,8 +12771,8 @@
             </p:nvSpPr>
             <p:spPr>
               <a:xfrm>
-                <a:off x="465012" y="4611969"/>
-                <a:ext cx="11190859" cy="2235292"/>
+                <a:off x="106077" y="3896122"/>
+                <a:ext cx="11833135" cy="2969916"/>
               </a:xfrm>
               <a:prstGeom prst="rect">
                 <a:avLst/>
@@ -13197,17 +12787,10 @@
               <a:p>
                 <a:r>
                   <a:rPr lang="en-US" sz="2200" dirty="0"/>
-                  <a:t>Combining these, </a:t>
+                  <a:t>Assuming </a:t>
                 </a:r>
                 <a14:m>
                   <m:oMath xmlns:m="http://schemas.openxmlformats.org/officeDocument/2006/math">
-                    <m:r>
-                      <a:rPr lang="en-US" sz="2200" b="1" i="1">
-                        <a:latin typeface="Cambria Math" panose="02040503050406030204" pitchFamily="18" charset="0"/>
-                        <a:ea typeface="Cambria Math" panose="02040503050406030204" pitchFamily="18" charset="0"/>
-                      </a:rPr>
-                      <m:t>∆</m:t>
-                    </m:r>
                     <m:sSub>
                       <m:sSubPr>
                         <m:ctrlPr>
@@ -13223,7 +12806,7 @@
                             <a:latin typeface="Cambria Math" panose="02040503050406030204" pitchFamily="18" charset="0"/>
                             <a:ea typeface="Cambria Math" panose="02040503050406030204" pitchFamily="18" charset="0"/>
                           </a:rPr>
-                          <m:t>𝑻</m:t>
+                          <m:t>𝑲</m:t>
                         </m:r>
                       </m:e>
                       <m:sub>
@@ -13232,123 +12815,10 @@
                             <a:latin typeface="Cambria Math" panose="02040503050406030204" pitchFamily="18" charset="0"/>
                             <a:ea typeface="Cambria Math" panose="02040503050406030204" pitchFamily="18" charset="0"/>
                           </a:rPr>
-                          <m:t>𝑭</m:t>
+                          <m:t>𝑨</m:t>
                         </m:r>
                       </m:sub>
                     </m:sSub>
-                    <m:r>
-                      <a:rPr lang="en-US" sz="2200" b="1" i="1" smtClean="0">
-                        <a:latin typeface="Cambria Math" panose="02040503050406030204" pitchFamily="18" charset="0"/>
-                        <a:ea typeface="Cambria Math" panose="02040503050406030204" pitchFamily="18" charset="0"/>
-                      </a:rPr>
-                      <m:t>=</m:t>
-                    </m:r>
-                    <m:f>
-                      <m:fPr>
-                        <m:ctrlPr>
-                          <a:rPr lang="en-US" sz="2200" b="1" i="1" smtClean="0">
-                            <a:latin typeface="Cambria Math" panose="02040503050406030204" pitchFamily="18" charset="0"/>
-                            <a:ea typeface="Cambria Math" panose="02040503050406030204" pitchFamily="18" charset="0"/>
-                          </a:rPr>
-                        </m:ctrlPr>
-                      </m:fPr>
-                      <m:num>
-                        <m:r>
-                          <a:rPr lang="en-US" sz="2200" b="1" i="1" smtClean="0">
-                            <a:latin typeface="Cambria Math" panose="02040503050406030204" pitchFamily="18" charset="0"/>
-                            <a:ea typeface="Cambria Math" panose="02040503050406030204" pitchFamily="18" charset="0"/>
-                          </a:rPr>
-                          <m:t>𝑪</m:t>
-                        </m:r>
-                      </m:num>
-                      <m:den>
-                        <m:r>
-                          <a:rPr lang="en-US" sz="2200" b="1" i="1">
-                            <a:latin typeface="Cambria Math" panose="02040503050406030204" pitchFamily="18" charset="0"/>
-                            <a:ea typeface="Cambria Math" panose="02040503050406030204" pitchFamily="18" charset="0"/>
-                          </a:rPr>
-                          <m:t>∆</m:t>
-                        </m:r>
-                        <m:sSub>
-                          <m:sSubPr>
-                            <m:ctrlPr>
-                              <a:rPr lang="en-US" sz="2200" b="1" i="1">
-                                <a:latin typeface="Cambria Math" panose="02040503050406030204" pitchFamily="18" charset="0"/>
-                                <a:ea typeface="Cambria Math" panose="02040503050406030204" pitchFamily="18" charset="0"/>
-                              </a:rPr>
-                            </m:ctrlPr>
-                          </m:sSubPr>
-                          <m:e>
-                            <m:r>
-                              <a:rPr lang="en-US" sz="2200" b="1" i="1">
-                                <a:latin typeface="Cambria Math" panose="02040503050406030204" pitchFamily="18" charset="0"/>
-                                <a:ea typeface="Cambria Math" panose="02040503050406030204" pitchFamily="18" charset="0"/>
-                              </a:rPr>
-                              <m:t>𝑯</m:t>
-                            </m:r>
-                          </m:e>
-                          <m:sub>
-                            <m:r>
-                              <a:rPr lang="en-US" sz="2200" b="1" i="1" smtClean="0">
-                                <a:latin typeface="Cambria Math" panose="02040503050406030204" pitchFamily="18" charset="0"/>
-                                <a:ea typeface="Cambria Math" panose="02040503050406030204" pitchFamily="18" charset="0"/>
-                              </a:rPr>
-                              <m:t>𝒇𝒖𝒔</m:t>
-                            </m:r>
-                          </m:sub>
-                        </m:sSub>
-                      </m:den>
-                    </m:f>
-                    <m:r>
-                      <a:rPr lang="en-US" sz="2200" b="1" i="1" smtClean="0">
-                        <a:latin typeface="Cambria Math" panose="02040503050406030204" pitchFamily="18" charset="0"/>
-                        <a:ea typeface="Cambria Math" panose="02040503050406030204" pitchFamily="18" charset="0"/>
-                      </a:rPr>
-                      <m:t>×</m:t>
-                    </m:r>
-                    <m:sSub>
-                      <m:sSubPr>
-                        <m:ctrlPr>
-                          <a:rPr lang="en-US" sz="2200" b="1" i="1" smtClean="0">
-                            <a:latin typeface="Cambria Math" panose="02040503050406030204" pitchFamily="18" charset="0"/>
-                            <a:ea typeface="Cambria Math" panose="02040503050406030204" pitchFamily="18" charset="0"/>
-                          </a:rPr>
-                        </m:ctrlPr>
-                      </m:sSubPr>
-                      <m:e>
-                        <m:r>
-                          <a:rPr lang="en-US" sz="2200" b="1" i="1" smtClean="0">
-                            <a:latin typeface="Cambria Math" panose="02040503050406030204" pitchFamily="18" charset="0"/>
-                            <a:ea typeface="Cambria Math" panose="02040503050406030204" pitchFamily="18" charset="0"/>
-                          </a:rPr>
-                          <m:t>𝒃</m:t>
-                        </m:r>
-                      </m:e>
-                      <m:sub>
-                        <m:r>
-                          <a:rPr lang="en-US" sz="2200" b="1" i="1" smtClean="0">
-                            <a:latin typeface="Cambria Math" panose="02040503050406030204" pitchFamily="18" charset="0"/>
-                            <a:ea typeface="Cambria Math" panose="02040503050406030204" pitchFamily="18" charset="0"/>
-                          </a:rPr>
-                          <m:t>𝑩</m:t>
-                        </m:r>
-                      </m:sub>
-                    </m:sSub>
-                  </m:oMath>
-                </a14:m>
-                <a:r>
-                  <a:rPr lang="en-US" sz="2200" dirty="0"/>
-                  <a:t>. Assuming </a:t>
-                </a:r>
-                <a14:m>
-                  <m:oMath xmlns:m="http://schemas.openxmlformats.org/officeDocument/2006/math">
-                    <m:r>
-                      <a:rPr lang="en-US" sz="2200" i="1">
-                        <a:latin typeface="Cambria Math" panose="02040503050406030204" pitchFamily="18" charset="0"/>
-                        <a:ea typeface="Cambria Math" panose="02040503050406030204" pitchFamily="18" charset="0"/>
-                      </a:rPr>
-                      <m:t>𝐶</m:t>
-                    </m:r>
                   </m:oMath>
                 </a14:m>
                 <a:r>
@@ -13425,6 +12895,49 @@
                 </a14:m>
                 <a:r>
                   <a:rPr lang="en-US" sz="2200" dirty="0"/>
+                  <a:t>, </a:t>
+                </a:r>
+                <a14:m>
+                  <m:oMath xmlns:m="http://schemas.openxmlformats.org/officeDocument/2006/math">
+                    <m:r>
+                      <a:rPr lang="en-US" sz="2200" b="1" i="1">
+                        <a:latin typeface="Cambria Math" panose="02040503050406030204" pitchFamily="18" charset="0"/>
+                        <a:ea typeface="Cambria Math" panose="02040503050406030204" pitchFamily="18" charset="0"/>
+                      </a:rPr>
+                      <m:t>∆</m:t>
+                    </m:r>
+                    <m:sSub>
+                      <m:sSubPr>
+                        <m:ctrlPr>
+                          <a:rPr lang="en-US" sz="2200" b="1" i="1">
+                            <a:latin typeface="Cambria Math" panose="02040503050406030204" pitchFamily="18" charset="0"/>
+                            <a:ea typeface="Cambria Math" panose="02040503050406030204" pitchFamily="18" charset="0"/>
+                          </a:rPr>
+                        </m:ctrlPr>
+                      </m:sSubPr>
+                      <m:e>
+                        <m:r>
+                          <a:rPr lang="en-US" sz="2200" b="1" i="1">
+                            <a:latin typeface="Cambria Math" panose="02040503050406030204" pitchFamily="18" charset="0"/>
+                            <a:ea typeface="Cambria Math" panose="02040503050406030204" pitchFamily="18" charset="0"/>
+                          </a:rPr>
+                          <m:t>𝑯</m:t>
+                        </m:r>
+                      </m:e>
+                      <m:sub>
+                        <m:r>
+                          <a:rPr lang="en-US" sz="2200" b="1" i="1">
+                            <a:latin typeface="Cambria Math" panose="02040503050406030204" pitchFamily="18" charset="0"/>
+                            <a:ea typeface="Cambria Math" panose="02040503050406030204" pitchFamily="18" charset="0"/>
+                          </a:rPr>
+                          <m:t>𝒇𝒖𝒔</m:t>
+                        </m:r>
+                      </m:sub>
+                    </m:sSub>
+                  </m:oMath>
+                </a14:m>
+                <a:r>
+                  <a:rPr lang="en-US" sz="2200" dirty="0"/>
                   <a:t>, and </a:t>
                 </a:r>
                 <a14:m>
@@ -13458,10 +12971,147 @@
                 </a14:m>
                 <a:r>
                   <a:rPr lang="en-US" sz="2200" dirty="0"/>
-                  <a:t>, your tasks are:</a:t>
+                  <a:t>, use dimensional analysis to find an algebraic expression for </a:t>
+                </a:r>
+                <a14:m>
+                  <m:oMath xmlns:m="http://schemas.openxmlformats.org/officeDocument/2006/math">
+                    <m:sSub>
+                      <m:sSubPr>
+                        <m:ctrlPr>
+                          <a:rPr lang="en-US" sz="2200" b="1" i="1">
+                            <a:latin typeface="Cambria Math" panose="02040503050406030204" pitchFamily="18" charset="0"/>
+                            <a:ea typeface="Cambria Math" panose="02040503050406030204" pitchFamily="18" charset="0"/>
+                          </a:rPr>
+                        </m:ctrlPr>
+                      </m:sSubPr>
+                      <m:e>
+                        <m:r>
+                          <a:rPr lang="en-US" sz="2200" b="1" i="1">
+                            <a:latin typeface="Cambria Math" panose="02040503050406030204" pitchFamily="18" charset="0"/>
+                            <a:ea typeface="Cambria Math" panose="02040503050406030204" pitchFamily="18" charset="0"/>
+                          </a:rPr>
+                          <m:t>𝑲</m:t>
+                        </m:r>
+                      </m:e>
+                      <m:sub>
+                        <m:r>
+                          <a:rPr lang="en-US" sz="2200" b="1" i="1">
+                            <a:latin typeface="Cambria Math" panose="02040503050406030204" pitchFamily="18" charset="0"/>
+                            <a:ea typeface="Cambria Math" panose="02040503050406030204" pitchFamily="18" charset="0"/>
+                          </a:rPr>
+                          <m:t>𝑨</m:t>
+                        </m:r>
+                      </m:sub>
+                    </m:sSub>
+                  </m:oMath>
+                </a14:m>
+                <a:r>
+                  <a:rPr lang="en-US" sz="2200" dirty="0"/>
+                  <a:t>. </a:t>
                 </a:r>
               </a:p>
               <a:p>
+                <a:endParaRPr lang="en-US" sz="2200" dirty="0"/>
+              </a:p>
+              <a:p>
+                <a:r>
+                  <a:rPr lang="en-US" sz="2200" dirty="0"/>
+                  <a:t>Hints: </a:t>
+                </a:r>
+              </a:p>
+              <a:p>
+                <a:pPr marL="342900" indent="-342900">
+                  <a:buFont typeface="Arial" panose="020B0604020202020204" pitchFamily="34" charset="0"/>
+                  <a:buChar char="•"/>
+                </a:pPr>
+                <a:r>
+                  <a:rPr lang="en-US" sz="2200" dirty="0"/>
+                  <a:t>The units of </a:t>
+                </a:r>
+                <a14:m>
+                  <m:oMath xmlns:m="http://schemas.openxmlformats.org/officeDocument/2006/math">
+                    <m:sSub>
+                      <m:sSubPr>
+                        <m:ctrlPr>
+                          <a:rPr lang="en-US" sz="2200" b="1" i="1">
+                            <a:latin typeface="Cambria Math" panose="02040503050406030204" pitchFamily="18" charset="0"/>
+                            <a:ea typeface="Cambria Math" panose="02040503050406030204" pitchFamily="18" charset="0"/>
+                          </a:rPr>
+                        </m:ctrlPr>
+                      </m:sSubPr>
+                      <m:e>
+                        <m:r>
+                          <a:rPr lang="en-US" sz="2200" b="1" i="1">
+                            <a:latin typeface="Cambria Math" panose="02040503050406030204" pitchFamily="18" charset="0"/>
+                            <a:ea typeface="Cambria Math" panose="02040503050406030204" pitchFamily="18" charset="0"/>
+                          </a:rPr>
+                          <m:t>𝑲</m:t>
+                        </m:r>
+                      </m:e>
+                      <m:sub>
+                        <m:r>
+                          <a:rPr lang="en-US" sz="2200" b="1" i="1">
+                            <a:latin typeface="Cambria Math" panose="02040503050406030204" pitchFamily="18" charset="0"/>
+                            <a:ea typeface="Cambria Math" panose="02040503050406030204" pitchFamily="18" charset="0"/>
+                          </a:rPr>
+                          <m:t>𝑨</m:t>
+                        </m:r>
+                      </m:sub>
+                    </m:sSub>
+                    <m:r>
+                      <a:rPr lang="en-US" sz="2200" b="1" i="1">
+                        <a:latin typeface="Cambria Math" panose="02040503050406030204" pitchFamily="18" charset="0"/>
+                        <a:ea typeface="Cambria Math" panose="02040503050406030204" pitchFamily="18" charset="0"/>
+                      </a:rPr>
+                      <m:t> </m:t>
+                    </m:r>
+                  </m:oMath>
+                </a14:m>
+                <a:r>
+                  <a:rPr lang="en-US" sz="2200" dirty="0"/>
+                  <a:t>must be </a:t>
+                </a:r>
+                <a14:m>
+                  <m:oMath xmlns:m="http://schemas.openxmlformats.org/officeDocument/2006/math">
+                    <m:f>
+                      <m:fPr>
+                        <m:ctrlPr>
+                          <a:rPr lang="en-US" sz="2200" i="1">
+                            <a:latin typeface="Cambria Math" panose="02040503050406030204" pitchFamily="18" charset="0"/>
+                          </a:rPr>
+                        </m:ctrlPr>
+                      </m:fPr>
+                      <m:num>
+                        <m:r>
+                          <a:rPr lang="en-US" sz="2200" i="1">
+                            <a:latin typeface="Cambria Math" panose="02040503050406030204" pitchFamily="18" charset="0"/>
+                          </a:rPr>
+                          <m:t>𝐾</m:t>
+                        </m:r>
+                      </m:num>
+                      <m:den>
+                        <m:r>
+                          <a:rPr lang="en-US" sz="2200" i="1">
+                            <a:latin typeface="Cambria Math" panose="02040503050406030204" pitchFamily="18" charset="0"/>
+                          </a:rPr>
+                          <m:t>𝑚𝑜𝑙</m:t>
+                        </m:r>
+                        <m:r>
+                          <a:rPr lang="en-US" sz="2200" i="1">
+                            <a:latin typeface="Cambria Math" panose="02040503050406030204" pitchFamily="18" charset="0"/>
+                          </a:rPr>
+                          <m:t>/</m:t>
+                        </m:r>
+                        <m:r>
+                          <a:rPr lang="en-US" sz="2200" i="1">
+                            <a:latin typeface="Cambria Math" panose="02040503050406030204" pitchFamily="18" charset="0"/>
+                          </a:rPr>
+                          <m:t>𝑘𝑔</m:t>
+                        </m:r>
+                      </m:den>
+                    </m:f>
+                  </m:oMath>
+                </a14:m>
                 <a:endParaRPr lang="en-US" sz="2200" dirty="0"/>
               </a:p>
               <a:p>
@@ -13471,39 +13121,49 @@
                 </a:pPr>
                 <a:r>
                   <a:rPr lang="en-US" sz="2200" dirty="0"/>
-                  <a:t>Use dimensional analysis to find an algebraic expression for </a:t>
+                  <a:t>It’s reasonable to guess that </a:t>
                 </a:r>
                 <a14:m>
                   <m:oMath xmlns:m="http://schemas.openxmlformats.org/officeDocument/2006/math">
+                    <m:sSub>
+                      <m:sSubPr>
+                        <m:ctrlPr>
+                          <a:rPr lang="en-US" sz="2200" b="1" i="1">
+                            <a:latin typeface="Cambria Math" panose="02040503050406030204" pitchFamily="18" charset="0"/>
+                            <a:ea typeface="Cambria Math" panose="02040503050406030204" pitchFamily="18" charset="0"/>
+                          </a:rPr>
+                        </m:ctrlPr>
+                      </m:sSubPr>
+                      <m:e>
+                        <m:r>
+                          <a:rPr lang="en-US" sz="2200" b="1" i="1">
+                            <a:latin typeface="Cambria Math" panose="02040503050406030204" pitchFamily="18" charset="0"/>
+                            <a:ea typeface="Cambria Math" panose="02040503050406030204" pitchFamily="18" charset="0"/>
+                          </a:rPr>
+                          <m:t>𝑲</m:t>
+                        </m:r>
+                      </m:e>
+                      <m:sub>
+                        <m:r>
+                          <a:rPr lang="en-US" sz="2200" b="1" i="1">
+                            <a:latin typeface="Cambria Math" panose="02040503050406030204" pitchFamily="18" charset="0"/>
+                            <a:ea typeface="Cambria Math" panose="02040503050406030204" pitchFamily="18" charset="0"/>
+                          </a:rPr>
+                          <m:t>𝑨</m:t>
+                        </m:r>
+                      </m:sub>
+                    </m:sSub>
                     <m:r>
-                      <a:rPr lang="en-US" sz="2200" i="1">
+                      <a:rPr lang="en-US" sz="2200" b="1" i="1">
                         <a:latin typeface="Cambria Math" panose="02040503050406030204" pitchFamily="18" charset="0"/>
                         <a:ea typeface="Cambria Math" panose="02040503050406030204" pitchFamily="18" charset="0"/>
                       </a:rPr>
-                      <m:t>𝐶</m:t>
+                      <m:t>∝</m:t>
                     </m:r>
-                  </m:oMath>
-                </a14:m>
-                <a:r>
-                  <a:rPr lang="en-US" sz="2200" dirty="0"/>
-                  <a:t>.</a:t>
-                </a:r>
-              </a:p>
-              <a:p>
-                <a:pPr marL="342900" indent="-342900">
-                  <a:buFont typeface="Arial" panose="020B0604020202020204" pitchFamily="34" charset="0"/>
-                  <a:buChar char="•"/>
-                </a:pPr>
-                <a:r>
-                  <a:rPr lang="en-US" sz="2200" dirty="0"/>
-                  <a:t>Evaluate </a:t>
-                </a:r>
-                <a14:m>
-                  <m:oMath xmlns:m="http://schemas.openxmlformats.org/officeDocument/2006/math">
                     <m:f>
                       <m:fPr>
                         <m:ctrlPr>
-                          <a:rPr lang="en-US" sz="2200" i="1">
+                          <a:rPr lang="en-US" sz="2200" b="1" i="1">
                             <a:latin typeface="Cambria Math" panose="02040503050406030204" pitchFamily="18" charset="0"/>
                             <a:ea typeface="Cambria Math" panose="02040503050406030204" pitchFamily="18" charset="0"/>
                           </a:rPr>
@@ -13511,16 +13171,16 @@
                       </m:fPr>
                       <m:num>
                         <m:r>
-                          <a:rPr lang="en-US" sz="2200" i="1">
+                          <a:rPr lang="en-US" sz="2200" b="1" i="1">
                             <a:latin typeface="Cambria Math" panose="02040503050406030204" pitchFamily="18" charset="0"/>
                             <a:ea typeface="Cambria Math" panose="02040503050406030204" pitchFamily="18" charset="0"/>
                           </a:rPr>
-                          <m:t>𝐶</m:t>
+                          <m:t>𝟏</m:t>
                         </m:r>
                       </m:num>
                       <m:den>
                         <m:r>
-                          <a:rPr lang="en-US" sz="2200" i="1">
+                          <a:rPr lang="en-US" sz="2200" b="1" i="1">
                             <a:latin typeface="Cambria Math" panose="02040503050406030204" pitchFamily="18" charset="0"/>
                             <a:ea typeface="Cambria Math" panose="02040503050406030204" pitchFamily="18" charset="0"/>
                           </a:rPr>
@@ -13529,7 +13189,7 @@
                         <m:sSub>
                           <m:sSubPr>
                             <m:ctrlPr>
-                              <a:rPr lang="en-US" sz="2200" i="1">
+                              <a:rPr lang="en-US" sz="2200" b="1" i="1">
                                 <a:latin typeface="Cambria Math" panose="02040503050406030204" pitchFamily="18" charset="0"/>
                                 <a:ea typeface="Cambria Math" panose="02040503050406030204" pitchFamily="18" charset="0"/>
                               </a:rPr>
@@ -13537,20 +13197,20 @@
                           </m:sSubPr>
                           <m:e>
                             <m:r>
-                              <a:rPr lang="en-US" sz="2200" i="1">
+                              <a:rPr lang="en-US" sz="2200" b="1" i="1">
                                 <a:latin typeface="Cambria Math" panose="02040503050406030204" pitchFamily="18" charset="0"/>
                                 <a:ea typeface="Cambria Math" panose="02040503050406030204" pitchFamily="18" charset="0"/>
                               </a:rPr>
-                              <m:t>𝐻</m:t>
+                              <m:t>𝑯</m:t>
                             </m:r>
                           </m:e>
                           <m:sub>
                             <m:r>
-                              <a:rPr lang="en-US" sz="2200" i="1">
+                              <a:rPr lang="en-US" sz="2200" b="1" i="1">
                                 <a:latin typeface="Cambria Math" panose="02040503050406030204" pitchFamily="18" charset="0"/>
                                 <a:ea typeface="Cambria Math" panose="02040503050406030204" pitchFamily="18" charset="0"/>
                               </a:rPr>
-                              <m:t>𝑓𝑢𝑠</m:t>
+                              <m:t>𝒇𝒖𝒔</m:t>
                             </m:r>
                           </m:sub>
                         </m:sSub>
@@ -13560,17 +13220,25 @@
                 </a14:m>
                 <a:r>
                   <a:rPr lang="en-US" sz="2200" dirty="0"/>
-                  <a:t> numerically to see if you come close to the known value of </a:t>
+                  <a:t>. </a:t>
+                </a:r>
+                <a:r>
+                  <a:rPr lang="en-US" sz="2400" dirty="0"/>
+                  <a:t>Why? </a:t>
                 </a:r>
                 <a14:m>
                   <m:oMath xmlns:m="http://schemas.openxmlformats.org/officeDocument/2006/math">
+                    <m:r>
+                      <a:rPr lang="en-US" sz="2400" i="1">
+                        <a:latin typeface="Cambria Math" panose="02040503050406030204" pitchFamily="18" charset="0"/>
+                        <a:ea typeface="Cambria Math" panose="02040503050406030204" pitchFamily="18" charset="0"/>
+                      </a:rPr>
+                      <m:t>∆</m:t>
+                    </m:r>
                     <m:sSub>
                       <m:sSubPr>
                         <m:ctrlPr>
-                          <a:rPr lang="en-US" sz="2400" i="1" smtClean="0">
-                            <a:solidFill>
-                              <a:schemeClr val="tx1"/>
-                            </a:solidFill>
+                          <a:rPr lang="en-US" sz="2400" i="1">
                             <a:latin typeface="Cambria Math" panose="02040503050406030204" pitchFamily="18" charset="0"/>
                             <a:ea typeface="Cambria Math" panose="02040503050406030204" pitchFamily="18" charset="0"/>
                           </a:rPr>
@@ -13578,77 +13246,131 @@
                       </m:sSubPr>
                       <m:e>
                         <m:r>
-                          <a:rPr lang="en-US" sz="2400" b="0" i="1">
-                            <a:solidFill>
-                              <a:schemeClr val="tx1"/>
-                            </a:solidFill>
+                          <a:rPr lang="en-US" sz="2400" i="1">
                             <a:latin typeface="Cambria Math" panose="02040503050406030204" pitchFamily="18" charset="0"/>
                             <a:ea typeface="Cambria Math" panose="02040503050406030204" pitchFamily="18" charset="0"/>
                           </a:rPr>
-                          <m:t>𝐾</m:t>
+                          <m:t>𝑇</m:t>
                         </m:r>
                       </m:e>
                       <m:sub>
-                        <m:sSub>
-                          <m:sSubPr>
-                            <m:ctrlPr>
-                              <a:rPr lang="en-US" sz="2400" i="1" smtClean="0">
-                                <a:solidFill>
-                                  <a:schemeClr val="tx1"/>
-                                </a:solidFill>
-                                <a:latin typeface="Cambria Math" panose="02040503050406030204" pitchFamily="18" charset="0"/>
-                                <a:ea typeface="Cambria Math" panose="02040503050406030204" pitchFamily="18" charset="0"/>
-                              </a:rPr>
-                            </m:ctrlPr>
-                          </m:sSubPr>
-                          <m:e>
-                            <m:r>
-                              <a:rPr lang="en-US" sz="2400" b="0" i="1" smtClean="0">
-                                <a:solidFill>
-                                  <a:schemeClr val="tx1"/>
-                                </a:solidFill>
-                                <a:latin typeface="Cambria Math" panose="02040503050406030204" pitchFamily="18" charset="0"/>
-                                <a:ea typeface="Cambria Math" panose="02040503050406030204" pitchFamily="18" charset="0"/>
-                              </a:rPr>
-                              <m:t>𝐻</m:t>
-                            </m:r>
-                          </m:e>
-                          <m:sub>
-                            <m:r>
-                              <a:rPr lang="en-US" sz="2400" b="0" i="1" smtClean="0">
-                                <a:solidFill>
-                                  <a:schemeClr val="tx1"/>
-                                </a:solidFill>
-                                <a:latin typeface="Cambria Math" panose="02040503050406030204" pitchFamily="18" charset="0"/>
-                                <a:ea typeface="Cambria Math" panose="02040503050406030204" pitchFamily="18" charset="0"/>
-                              </a:rPr>
-                              <m:t>2</m:t>
-                            </m:r>
-                          </m:sub>
-                        </m:sSub>
                         <m:r>
-                          <a:rPr lang="en-US" sz="2400" b="0" i="1" smtClean="0">
-                            <a:solidFill>
-                              <a:schemeClr val="tx1"/>
-                            </a:solidFill>
+                          <a:rPr lang="en-US" sz="2400" i="1">
                             <a:latin typeface="Cambria Math" panose="02040503050406030204" pitchFamily="18" charset="0"/>
                             <a:ea typeface="Cambria Math" panose="02040503050406030204" pitchFamily="18" charset="0"/>
                           </a:rPr>
-                          <m:t>𝑂</m:t>
+                          <m:t>𝐹</m:t>
                         </m:r>
                       </m:sub>
                     </m:sSub>
                   </m:oMath>
                 </a14:m>
                 <a:r>
-                  <a:rPr lang="en-US" sz="2200" dirty="0">
-                    <a:solidFill>
-                      <a:schemeClr val="tx1"/>
-                    </a:solidFill>
-                  </a:rPr>
-                  <a:t>.  </a:t>
+                  <a:rPr lang="en-US" sz="2400" dirty="0"/>
+                  <a:t> will be </a:t>
                 </a:r>
-                <a:endParaRPr lang="en-US" sz="2200" dirty="0"/>
+                <a:r>
+                  <a:rPr lang="en-US" sz="2400" b="1" dirty="0"/>
+                  <a:t>big</a:t>
+                </a:r>
+                <a:r>
+                  <a:rPr lang="en-US" sz="2400" dirty="0"/>
+                  <a:t> when the difference between </a:t>
+                </a:r>
+                <a14:m>
+                  <m:oMath xmlns:m="http://schemas.openxmlformats.org/officeDocument/2006/math">
+                    <m:r>
+                      <a:rPr lang="en-US" sz="2400" b="1" i="1">
+                        <a:latin typeface="Cambria Math" panose="02040503050406030204" pitchFamily="18" charset="0"/>
+                        <a:ea typeface="Cambria Math" panose="02040503050406030204" pitchFamily="18" charset="0"/>
+                      </a:rPr>
+                      <m:t>∆</m:t>
+                    </m:r>
+                    <m:sSub>
+                      <m:sSubPr>
+                        <m:ctrlPr>
+                          <a:rPr lang="en-US" sz="2400" b="1" i="1">
+                            <a:latin typeface="Cambria Math" panose="02040503050406030204" pitchFamily="18" charset="0"/>
+                            <a:ea typeface="Cambria Math" panose="02040503050406030204" pitchFamily="18" charset="0"/>
+                          </a:rPr>
+                        </m:ctrlPr>
+                      </m:sSubPr>
+                      <m:e>
+                        <m:r>
+                          <a:rPr lang="en-US" sz="2400" b="1" i="1">
+                            <a:latin typeface="Cambria Math" panose="02040503050406030204" pitchFamily="18" charset="0"/>
+                            <a:ea typeface="Cambria Math" panose="02040503050406030204" pitchFamily="18" charset="0"/>
+                          </a:rPr>
+                          <m:t>𝑯</m:t>
+                        </m:r>
+                      </m:e>
+                      <m:sub>
+                        <m:r>
+                          <a:rPr lang="en-US" sz="2400" b="1" i="1" smtClean="0">
+                            <a:latin typeface="Cambria Math" panose="02040503050406030204" pitchFamily="18" charset="0"/>
+                            <a:ea typeface="Cambria Math" panose="02040503050406030204" pitchFamily="18" charset="0"/>
+                          </a:rPr>
+                          <m:t>𝒔𝒖𝒃</m:t>
+                        </m:r>
+                      </m:sub>
+                    </m:sSub>
+                  </m:oMath>
+                </a14:m>
+                <a:r>
+                  <a:rPr lang="en-US" sz="2400" dirty="0"/>
+                  <a:t> and </a:t>
+                </a:r>
+                <a14:m>
+                  <m:oMath xmlns:m="http://schemas.openxmlformats.org/officeDocument/2006/math">
+                    <m:r>
+                      <a:rPr lang="en-US" sz="2400" b="1" i="1">
+                        <a:latin typeface="Cambria Math" panose="02040503050406030204" pitchFamily="18" charset="0"/>
+                        <a:ea typeface="Cambria Math" panose="02040503050406030204" pitchFamily="18" charset="0"/>
+                      </a:rPr>
+                      <m:t>∆</m:t>
+                    </m:r>
+                    <m:sSub>
+                      <m:sSubPr>
+                        <m:ctrlPr>
+                          <a:rPr lang="en-US" sz="2400" b="1" i="1">
+                            <a:latin typeface="Cambria Math" panose="02040503050406030204" pitchFamily="18" charset="0"/>
+                            <a:ea typeface="Cambria Math" panose="02040503050406030204" pitchFamily="18" charset="0"/>
+                          </a:rPr>
+                        </m:ctrlPr>
+                      </m:sSubPr>
+                      <m:e>
+                        <m:r>
+                          <a:rPr lang="en-US" sz="2400" b="1" i="1">
+                            <a:latin typeface="Cambria Math" panose="02040503050406030204" pitchFamily="18" charset="0"/>
+                            <a:ea typeface="Cambria Math" panose="02040503050406030204" pitchFamily="18" charset="0"/>
+                          </a:rPr>
+                          <m:t>𝑯</m:t>
+                        </m:r>
+                      </m:e>
+                      <m:sub>
+                        <m:r>
+                          <a:rPr lang="en-US" sz="2400" b="1" i="1" smtClean="0">
+                            <a:latin typeface="Cambria Math" panose="02040503050406030204" pitchFamily="18" charset="0"/>
+                            <a:ea typeface="Cambria Math" panose="02040503050406030204" pitchFamily="18" charset="0"/>
+                          </a:rPr>
+                          <m:t>𝒗𝒂𝒑</m:t>
+                        </m:r>
+                      </m:sub>
+                    </m:sSub>
+                  </m:oMath>
+                </a14:m>
+                <a:r>
+                  <a:rPr lang="en-US" sz="2400" dirty="0"/>
+                  <a:t> slopes is </a:t>
+                </a:r>
+                <a:r>
+                  <a:rPr lang="en-US" sz="2400" b="1" dirty="0"/>
+                  <a:t>small</a:t>
+                </a:r>
+                <a:r>
+                  <a:rPr lang="en-US" sz="2400" dirty="0"/>
+                  <a:t>. </a:t>
+                </a:r>
               </a:p>
             </p:txBody>
           </p:sp>
@@ -13670,8 +13392,8 @@
             </p:nvSpPr>
             <p:spPr>
               <a:xfrm>
-                <a:off x="465012" y="4611969"/>
-                <a:ext cx="11190859" cy="2235292"/>
+                <a:off x="106077" y="3896122"/>
+                <a:ext cx="11833135" cy="2969916"/>
               </a:xfrm>
               <a:prstGeom prst="rect">
                 <a:avLst/>
@@ -13679,7 +13401,7 @@
               <a:blipFill>
                 <a:blip r:embed="rId10"/>
                 <a:stretch>
-                  <a:fillRect l="-680"/>
+                  <a:fillRect l="-643" t="-1277" b="-2979"/>
                 </a:stretch>
               </a:blipFill>
             </p:spPr>

</xml_diff>